<commit_message>
Update Using the Compiler API in Real-World Scenarios.pptx
</commit_message>
<xml_diff>
--- a/Using the Compiler API in Real-World Scenarios.pptx
+++ b/Using the Compiler API in Real-World Scenarios.pptx
@@ -5,7 +5,7 @@
     <p:sldMasterId id="2147483648" r:id="rId4"/>
   </p:sldMasterIdLst>
   <p:notesMasterIdLst>
-    <p:notesMasterId r:id="rId20"/>
+    <p:notesMasterId r:id="rId21"/>
   </p:notesMasterIdLst>
   <p:sldIdLst>
     <p:sldId id="271" r:id="rId5"/>
@@ -22,7 +22,8 @@
     <p:sldId id="281" r:id="rId16"/>
     <p:sldId id="282" r:id="rId17"/>
     <p:sldId id="290" r:id="rId18"/>
-    <p:sldId id="317" r:id="rId19"/>
+    <p:sldId id="346" r:id="rId19"/>
+    <p:sldId id="317" r:id="rId20"/>
   </p:sldIdLst>
   <p:sldSz cx="12192000" cy="6858000"/>
   <p:notesSz cx="6858000" cy="9144000"/>
@@ -3183,7 +3184,7 @@
           <a:p>
             <a:fld id="{9ECE5BDF-9B7E-3646-B6C9-FC2C3E116129}" type="datetimeFigureOut">
               <a:rPr lang="en-US" smtClean="0"/>
-              <a:t>4/14/2020</a:t>
+              <a:t>5/12/2020</a:t>
             </a:fld>
             <a:endParaRPr lang="en-US"/>
           </a:p>
@@ -3789,6 +3790,93 @@
           <a:lstStyle/>
           <a:p>
             <a:r>
+              <a:rPr lang="en-US" dirty="0"/>
+              <a:t>This is (probably) coming in C#9. Dive in!</a:t>
+            </a:r>
+          </a:p>
+        </p:txBody>
+      </p:sp>
+      <p:sp>
+        <p:nvSpPr>
+          <p:cNvPr id="4" name="Slide Number Placeholder 3"/>
+          <p:cNvSpPr>
+            <a:spLocks noGrp="1"/>
+          </p:cNvSpPr>
+          <p:nvPr>
+            <p:ph type="sldNum" sz="quarter" idx="10"/>
+          </p:nvPr>
+        </p:nvSpPr>
+        <p:spPr/>
+        <p:txBody>
+          <a:bodyPr/>
+          <a:lstStyle/>
+          <a:p>
+            <a:fld id="{4E8BADB7-1FBB-B74E-B90C-DA1567BD042E}" type="slidenum">
+              <a:rPr lang="en-US" smtClean="0"/>
+              <a:t>15</a:t>
+            </a:fld>
+            <a:endParaRPr lang="en-US"/>
+          </a:p>
+        </p:txBody>
+      </p:sp>
+    </p:spTree>
+    <p:extLst>
+      <p:ext uri="{BB962C8B-B14F-4D97-AF65-F5344CB8AC3E}">
+        <p14:creationId xmlns:p14="http://schemas.microsoft.com/office/powerpoint/2010/main" val="3412222013"/>
+      </p:ext>
+    </p:extLst>
+  </p:cSld>
+  <p:clrMapOvr>
+    <a:masterClrMapping/>
+  </p:clrMapOvr>
+</p:notes>
+</file>
+
+<file path=ppt/notesSlides/notesSlide13.xml><?xml version="1.0" encoding="utf-8"?>
+<p:notes xmlns:a="http://schemas.openxmlformats.org/drawingml/2006/main" xmlns:r="http://schemas.openxmlformats.org/officeDocument/2006/relationships" xmlns:p="http://schemas.openxmlformats.org/presentationml/2006/main">
+  <p:cSld>
+    <p:spTree>
+      <p:nvGrpSpPr>
+        <p:cNvPr id="1" name=""/>
+        <p:cNvGrpSpPr/>
+        <p:nvPr/>
+      </p:nvGrpSpPr>
+      <p:grpSpPr>
+        <a:xfrm>
+          <a:off x="0" y="0"/>
+          <a:ext cx="0" cy="0"/>
+          <a:chOff x="0" y="0"/>
+          <a:chExt cx="0" cy="0"/>
+        </a:xfrm>
+      </p:grpSpPr>
+      <p:sp>
+        <p:nvSpPr>
+          <p:cNvPr id="2" name="Slide Image Placeholder 1"/>
+          <p:cNvSpPr>
+            <a:spLocks noGrp="1" noRot="1" noChangeAspect="1"/>
+          </p:cNvSpPr>
+          <p:nvPr>
+            <p:ph type="sldImg"/>
+          </p:nvPr>
+        </p:nvSpPr>
+        <p:spPr/>
+      </p:sp>
+      <p:sp>
+        <p:nvSpPr>
+          <p:cNvPr id="3" name="Notes Placeholder 2"/>
+          <p:cNvSpPr>
+            <a:spLocks noGrp="1"/>
+          </p:cNvSpPr>
+          <p:nvPr>
+            <p:ph type="body" idx="1"/>
+          </p:nvPr>
+        </p:nvSpPr>
+        <p:spPr/>
+        <p:txBody>
+          <a:bodyPr/>
+          <a:lstStyle/>
+          <a:p>
+            <a:r>
               <a:rPr lang="en-US" sz="1200" kern="1200" dirty="0">
                 <a:solidFill>
                   <a:schemeClr val="tx1"/>
@@ -3876,6 +3964,125 @@
                 <a:ea typeface="+mn-ea"/>
                 <a:cs typeface="Arial" charset="0"/>
               </a:rPr>
+              <a:t>Source Generators</a:t>
+            </a:r>
+          </a:p>
+          <a:p>
+            <a:r>
+              <a:rPr lang="en-US" sz="1200" kern="1200" dirty="0">
+                <a:solidFill>
+                  <a:schemeClr val="tx1"/>
+                </a:solidFill>
+                <a:effectLst/>
+                <a:latin typeface="Franklin Gothic Medium" pitchFamily="34" charset="0"/>
+                <a:ea typeface="+mn-ea"/>
+                <a:cs typeface="Arial" charset="0"/>
+              </a:rPr>
+              <a:t>Introducing C# Source Generators - </a:t>
+            </a:r>
+            <a:r>
+              <a:rPr lang="en-US" dirty="0"/>
+              <a:t>https://devblogs.microsoft.com/dotnet/introducing-c-source-generators/</a:t>
+            </a:r>
+            <a:endParaRPr lang="en-US" sz="1200" kern="1200" dirty="0">
+              <a:solidFill>
+                <a:schemeClr val="tx1"/>
+              </a:solidFill>
+              <a:effectLst/>
+              <a:latin typeface="+mn-lt"/>
+              <a:ea typeface="+mn-ea"/>
+              <a:cs typeface="+mn-cs"/>
+            </a:endParaRPr>
+          </a:p>
+          <a:p>
+            <a:r>
+              <a:rPr lang="en-US" sz="1200" kern="1200" dirty="0">
+                <a:solidFill>
+                  <a:schemeClr val="tx1"/>
+                </a:solidFill>
+                <a:effectLst/>
+                <a:latin typeface="+mn-lt"/>
+                <a:ea typeface="+mn-ea"/>
+                <a:cs typeface="+mn-cs"/>
+              </a:rPr>
+              <a:t>Source Generators Samples - </a:t>
+            </a:r>
+            <a:r>
+              <a:rPr lang="en-US" dirty="0"/>
+              <a:t>https://github.com/dotnet/roslyn-sdk/tree/master/samples/CSharp/SourceGenerators</a:t>
+            </a:r>
+          </a:p>
+          <a:p>
+            <a:r>
+              <a:rPr lang="en-US" sz="1200" kern="1200" dirty="0" err="1">
+                <a:solidFill>
+                  <a:schemeClr val="tx1"/>
+                </a:solidFill>
+                <a:effectLst/>
+                <a:latin typeface="Franklin Gothic Medium" pitchFamily="34" charset="0"/>
+                <a:ea typeface="+mn-ea"/>
+                <a:cs typeface="Arial" charset="0"/>
+              </a:rPr>
+              <a:t>INotifyPropertyChanged</a:t>
+            </a:r>
+            <a:r>
+              <a:rPr lang="en-US" sz="1200" kern="1200" dirty="0">
+                <a:solidFill>
+                  <a:schemeClr val="tx1"/>
+                </a:solidFill>
+                <a:effectLst/>
+                <a:latin typeface="Franklin Gothic Medium" pitchFamily="34" charset="0"/>
+                <a:ea typeface="+mn-ea"/>
+                <a:cs typeface="Arial" charset="0"/>
+              </a:rPr>
+              <a:t> with C# 9.0 Source Generators - </a:t>
+            </a:r>
+            <a:r>
+              <a:rPr lang="en-US" dirty="0"/>
+              <a:t>https://jaylee.org/archive/2020/04/29/notify-property-changed-with-rosyln-generators.html</a:t>
+            </a:r>
+          </a:p>
+          <a:p>
+            <a:r>
+              <a:rPr lang="en-US"/>
+              <a:t>C# Source Generators: Less Boilerplate Code, More Productivity - https</a:t>
+            </a:r>
+            <a:r>
+              <a:rPr lang="en-US" dirty="0"/>
+              <a:t>://dontcodetired.com/blog/post/C-Source-Generators-Less-Boilerplate-Code-More-Productivity</a:t>
+            </a:r>
+            <a:endParaRPr lang="en-US" sz="1200" kern="1200" dirty="0">
+              <a:solidFill>
+                <a:schemeClr val="tx1"/>
+              </a:solidFill>
+              <a:effectLst/>
+              <a:latin typeface="Franklin Gothic Medium" pitchFamily="34" charset="0"/>
+              <a:ea typeface="+mn-ea"/>
+              <a:cs typeface="Arial" charset="0"/>
+            </a:endParaRPr>
+          </a:p>
+          <a:p>
+            <a:endParaRPr lang="en-US" sz="1200" kern="1200" dirty="0">
+              <a:solidFill>
+                <a:schemeClr val="tx1"/>
+              </a:solidFill>
+              <a:effectLst/>
+              <a:latin typeface="Franklin Gothic Medium" pitchFamily="34" charset="0"/>
+              <a:ea typeface="+mn-ea"/>
+              <a:cs typeface="Arial" charset="0"/>
+            </a:endParaRPr>
+          </a:p>
+          <a:p>
+            <a:r>
+              <a:rPr lang="en-US" sz="1200" kern="1200" dirty="0">
+                <a:solidFill>
+                  <a:schemeClr val="tx1"/>
+                </a:solidFill>
+                <a:effectLst/>
+                <a:latin typeface="Franklin Gothic Medium" pitchFamily="34" charset="0"/>
+                <a:ea typeface="+mn-ea"/>
+                <a:cs typeface="Arial" charset="0"/>
+              </a:rPr>
               <a:t>Articles</a:t>
             </a:r>
           </a:p>
@@ -4612,7 +4819,7 @@
           <a:p>
             <a:fld id="{4E8BADB7-1FBB-B74E-B90C-DA1567BD042E}" type="slidenum">
               <a:rPr lang="en-US" smtClean="0"/>
-              <a:t>15</a:t>
+              <a:t>16</a:t>
             </a:fld>
             <a:endParaRPr lang="en-US"/>
           </a:p>
@@ -9308,6 +9515,120 @@
 </file>
 
 <file path=ppt/slides/slide15.xml><?xml version="1.0" encoding="utf-8"?>
+<p:sld xmlns:a="http://schemas.openxmlformats.org/drawingml/2006/main" xmlns:r="http://schemas.openxmlformats.org/officeDocument/2006/relationships" xmlns:p="http://schemas.openxmlformats.org/presentationml/2006/main">
+  <p:cSld>
+    <p:spTree>
+      <p:nvGrpSpPr>
+        <p:cNvPr id="1" name=""/>
+        <p:cNvGrpSpPr/>
+        <p:nvPr/>
+      </p:nvGrpSpPr>
+      <p:grpSpPr>
+        <a:xfrm>
+          <a:off x="0" y="0"/>
+          <a:ext cx="0" cy="0"/>
+          <a:chOff x="0" y="0"/>
+          <a:chExt cx="0" cy="0"/>
+        </a:xfrm>
+      </p:grpSpPr>
+      <p:sp>
+        <p:nvSpPr>
+          <p:cNvPr id="3" name="Title 2"/>
+          <p:cNvSpPr>
+            <a:spLocks noGrp="1"/>
+          </p:cNvSpPr>
+          <p:nvPr>
+            <p:ph type="title"/>
+          </p:nvPr>
+        </p:nvSpPr>
+        <p:spPr/>
+        <p:txBody>
+          <a:bodyPr/>
+          <a:lstStyle/>
+          <a:p>
+            <a:r>
+              <a:rPr lang="en-US" dirty="0"/>
+              <a:t>Source Generators</a:t>
+            </a:r>
+          </a:p>
+        </p:txBody>
+      </p:sp>
+      <p:sp>
+        <p:nvSpPr>
+          <p:cNvPr id="6" name="Rectangle 5"/>
+          <p:cNvSpPr/>
+          <p:nvPr/>
+        </p:nvSpPr>
+        <p:spPr>
+          <a:xfrm>
+            <a:off x="5610225" y="6276894"/>
+            <a:ext cx="6581775" cy="453605"/>
+          </a:xfrm>
+          <a:prstGeom prst="rect">
+            <a:avLst/>
+          </a:prstGeom>
+        </p:spPr>
+        <p:txBody>
+          <a:bodyPr wrap="square" anchor="ctr" anchorCtr="0">
+            <a:noAutofit/>
+          </a:bodyPr>
+          <a:lstStyle/>
+          <a:p>
+            <a:pPr algn="r"/>
+            <a:r>
+              <a:rPr lang="en-US" sz="1200" dirty="0">
+                <a:latin typeface="+mj-lt"/>
+                <a:cs typeface="Calibri" pitchFamily="34" charset="0"/>
+              </a:rPr>
+              <a:t>https://devblogs.microsoft.com/dotnet/introducing-c-source-generators/</a:t>
+            </a:r>
+          </a:p>
+        </p:txBody>
+      </p:sp>
+      <p:pic>
+        <p:nvPicPr>
+          <p:cNvPr id="2" name="Picture 1">
+            <a:extLst>
+              <a:ext uri="{FF2B5EF4-FFF2-40B4-BE49-F238E27FC236}">
+                <a16:creationId xmlns:a16="http://schemas.microsoft.com/office/drawing/2014/main" id="{3EF20BF3-4456-46F0-B3AF-94A78D523D72}"/>
+              </a:ext>
+            </a:extLst>
+          </p:cNvPr>
+          <p:cNvPicPr>
+            <a:picLocks noChangeAspect="1"/>
+          </p:cNvPicPr>
+          <p:nvPr/>
+        </p:nvPicPr>
+        <p:blipFill>
+          <a:blip r:embed="rId3"/>
+          <a:stretch>
+            <a:fillRect/>
+          </a:stretch>
+        </p:blipFill>
+        <p:spPr>
+          <a:xfrm>
+            <a:off x="2080652" y="1099812"/>
+            <a:ext cx="8030696" cy="4658375"/>
+          </a:xfrm>
+          <a:prstGeom prst="rect">
+            <a:avLst/>
+          </a:prstGeom>
+        </p:spPr>
+      </p:pic>
+    </p:spTree>
+    <p:extLst>
+      <p:ext uri="{BB962C8B-B14F-4D97-AF65-F5344CB8AC3E}">
+        <p14:creationId xmlns:p14="http://schemas.microsoft.com/office/powerpoint/2010/main" val="1826738028"/>
+      </p:ext>
+    </p:extLst>
+  </p:cSld>
+  <p:clrMapOvr>
+    <a:masterClrMapping/>
+  </p:clrMapOvr>
+</p:sld>
+</file>
+
+<file path=ppt/slides/slide16.xml><?xml version="1.0" encoding="utf-8"?>
 <p:sld xmlns:a="http://schemas.openxmlformats.org/drawingml/2006/main" xmlns:r="http://schemas.openxmlformats.org/officeDocument/2006/relationships" xmlns:p="http://schemas.openxmlformats.org/presentationml/2006/main">
   <p:cSld>
     <p:spTree>
@@ -11541,28 +11862,6 @@
 </file>
 
 <file path=customXml/item1.xml><?xml version="1.0" encoding="utf-8"?>
-<?mso-contentType ?>
-<FormTemplates xmlns="http://schemas.microsoft.com/sharepoint/v3/contenttype/forms">
-  <Display>DocumentLibraryForm</Display>
-  <Edit>DocumentLibraryForm</Edit>
-  <New>DocumentLibraryForm</New>
-</FormTemplates>
-</file>
-
-<file path=customXml/item2.xml><?xml version="1.0" encoding="utf-8"?>
-<p:properties xmlns:p="http://schemas.microsoft.com/office/2006/metadata/properties" xmlns:xsi="http://www.w3.org/2001/XMLSchema-instance" xmlns:pc="http://schemas.microsoft.com/office/infopath/2007/PartnerControls">
-  <documentManagement>
-    <Company xmlns="f0d6b4bb-fd12-4740-8884-687737dcca9a">Magenic</Company>
-    <Tech_x0020_Used xmlns="f0d6b4bb-fd12-4740-8884-687737dcca9a"/>
-    <Document_x0020_Type xmlns="f0d6b4bb-fd12-4740-8884-687737dcca9a">
-      <Value>Template</Value>
-    </Document_x0020_Type>
-    <Industry_x002f_Vertical xmlns="f0d6b4bb-fd12-4740-8884-687737dcca9a" xsi:nil="true"/>
-  </documentManagement>
-</p:properties>
-</file>
-
-<file path=customXml/item3.xml><?xml version="1.0" encoding="utf-8"?>
 <ct:contentTypeSchema xmlns:ct="http://schemas.microsoft.com/office/2006/metadata/contentType" xmlns:ma="http://schemas.microsoft.com/office/2006/metadata/properties/metaAttributes" ct:_="" ma:_="" ma:contentTypeName="Document" ma:contentTypeID="0x010100FD047A0B1BD8FE45B080D14CD83AD5DB" ma:contentTypeVersion="4" ma:contentTypeDescription="Create a new document." ma:contentTypeScope="" ma:versionID="bb8fe93aa668ed2e9af0b4a91588e96f">
   <xsd:schema xmlns:xsd="http://www.w3.org/2001/XMLSchema" xmlns:xs="http://www.w3.org/2001/XMLSchema" xmlns:p="http://schemas.microsoft.com/office/2006/metadata/properties" xmlns:ns2="f0d6b4bb-fd12-4740-8884-687737dcca9a" targetNamespace="http://schemas.microsoft.com/office/2006/metadata/properties" ma:root="true" ma:fieldsID="9ccf4b7a71e6b6cf55d0a74afbac0ca8" ns2:_="">
     <xsd:import namespace="f0d6b4bb-fd12-4740-8884-687737dcca9a"/>
@@ -11760,10 +12059,42 @@
 </ct:contentTypeSchema>
 </file>
 
+<file path=customXml/item2.xml><?xml version="1.0" encoding="utf-8"?>
+<p:properties xmlns:p="http://schemas.microsoft.com/office/2006/metadata/properties" xmlns:xsi="http://www.w3.org/2001/XMLSchema-instance" xmlns:pc="http://schemas.microsoft.com/office/infopath/2007/PartnerControls">
+  <documentManagement>
+    <Company xmlns="f0d6b4bb-fd12-4740-8884-687737dcca9a">Magenic</Company>
+    <Tech_x0020_Used xmlns="f0d6b4bb-fd12-4740-8884-687737dcca9a"/>
+    <Document_x0020_Type xmlns="f0d6b4bb-fd12-4740-8884-687737dcca9a">
+      <Value>Template</Value>
+    </Document_x0020_Type>
+    <Industry_x002f_Vertical xmlns="f0d6b4bb-fd12-4740-8884-687737dcca9a" xsi:nil="true"/>
+  </documentManagement>
+</p:properties>
+</file>
+
+<file path=customXml/item3.xml><?xml version="1.0" encoding="utf-8"?>
+<?mso-contentType ?>
+<FormTemplates xmlns="http://schemas.microsoft.com/sharepoint/v3/contenttype/forms">
+  <Display>DocumentLibraryForm</Display>
+  <Edit>DocumentLibraryForm</Edit>
+  <New>DocumentLibraryForm</New>
+</FormTemplates>
+</file>
+
 <file path=customXml/itemProps1.xml><?xml version="1.0" encoding="utf-8"?>
-<ds:datastoreItem xmlns:ds="http://schemas.openxmlformats.org/officeDocument/2006/customXml" ds:itemID="{D18D97D8-3C52-47EE-88EC-CF46155D7428}">
+<ds:datastoreItem xmlns:ds="http://schemas.openxmlformats.org/officeDocument/2006/customXml" ds:itemID="{554ECF4A-C03F-4D49-9C40-03179AA8928E}">
   <ds:schemaRefs>
-    <ds:schemaRef ds:uri="http://schemas.microsoft.com/sharepoint/v3/contenttype/forms"/>
+    <ds:schemaRef ds:uri="http://schemas.microsoft.com/office/2006/metadata/contentType"/>
+    <ds:schemaRef ds:uri="http://schemas.microsoft.com/office/2006/metadata/properties/metaAttributes"/>
+    <ds:schemaRef ds:uri="http://www.w3.org/2001/XMLSchema"/>
+    <ds:schemaRef ds:uri="http://schemas.microsoft.com/office/2006/metadata/properties"/>
+    <ds:schemaRef ds:uri="f0d6b4bb-fd12-4740-8884-687737dcca9a"/>
+    <ds:schemaRef ds:uri="http://schemas.microsoft.com/office/2006/documentManagement/types"/>
+    <ds:schemaRef ds:uri="http://schemas.microsoft.com/office/infopath/2007/PartnerControls"/>
+    <ds:schemaRef ds:uri="http://schemas.openxmlformats.org/package/2006/metadata/core-properties"/>
+    <ds:schemaRef ds:uri="http://purl.org/dc/elements/1.1/"/>
+    <ds:schemaRef ds:uri="http://purl.org/dc/terms/"/>
+    <ds:schemaRef ds:uri="http://schemas.microsoft.com/internal/obd"/>
   </ds:schemaRefs>
 </ds:datastoreItem>
 </file>
@@ -11785,19 +12116,9 @@
 </file>
 
 <file path=customXml/itemProps3.xml><?xml version="1.0" encoding="utf-8"?>
-<ds:datastoreItem xmlns:ds="http://schemas.openxmlformats.org/officeDocument/2006/customXml" ds:itemID="{554ECF4A-C03F-4D49-9C40-03179AA8928E}">
+<ds:datastoreItem xmlns:ds="http://schemas.openxmlformats.org/officeDocument/2006/customXml" ds:itemID="{D18D97D8-3C52-47EE-88EC-CF46155D7428}">
   <ds:schemaRefs>
-    <ds:schemaRef ds:uri="http://schemas.microsoft.com/office/2006/metadata/contentType"/>
-    <ds:schemaRef ds:uri="http://schemas.microsoft.com/office/2006/metadata/properties/metaAttributes"/>
-    <ds:schemaRef ds:uri="http://www.w3.org/2001/XMLSchema"/>
-    <ds:schemaRef ds:uri="http://schemas.microsoft.com/office/2006/metadata/properties"/>
-    <ds:schemaRef ds:uri="f0d6b4bb-fd12-4740-8884-687737dcca9a"/>
-    <ds:schemaRef ds:uri="http://schemas.microsoft.com/office/2006/documentManagement/types"/>
-    <ds:schemaRef ds:uri="http://schemas.microsoft.com/office/infopath/2007/PartnerControls"/>
-    <ds:schemaRef ds:uri="http://schemas.openxmlformats.org/package/2006/metadata/core-properties"/>
-    <ds:schemaRef ds:uri="http://purl.org/dc/elements/1.1/"/>
-    <ds:schemaRef ds:uri="http://purl.org/dc/terms/"/>
-    <ds:schemaRef ds:uri="http://schemas.microsoft.com/internal/obd"/>
+    <ds:schemaRef ds:uri="http://schemas.microsoft.com/sharepoint/v3/contenttype/forms"/>
   </ds:schemaRefs>
 </ds:datastoreItem>
 </file>
</xml_diff>